<commit_message>
week 16 hw and readme
</commit_message>
<xml_diff>
--- a/course_material/week_15/week_15_presentation.pptx
+++ b/course_material/week_15/week_15_presentation.pptx
@@ -4632,7 +4632,7 @@
           <a:p>
             <a:fld id="{5CF9EFDB-215C-4120-ADCB-EAD745B7163E}" type="datetimeFigureOut">
               <a:rPr lang="en-US" smtClean="0"/>
-              <a:t>6/5/2021</a:t>
+              <a:t>6/9/2021</a:t>
             </a:fld>
             <a:endParaRPr lang="en-US"/>
           </a:p>
@@ -5690,7 +5690,7 @@
           <a:p>
             <a:fld id="{ACF1A1B0-862D-4909-A7DB-D8ADA062DFCA}" type="datetimeFigureOut">
               <a:rPr lang="en-US" dirty="0"/>
-              <a:t>6/5/2021</a:t>
+              <a:t>6/9/2021</a:t>
             </a:fld>
             <a:endParaRPr lang="en-US"/>
           </a:p>
@@ -5913,7 +5913,7 @@
           <a:p>
             <a:fld id="{7B156144-9CB7-4E3A-B87E-A382F9BE05EF}" type="datetimeFigureOut">
               <a:rPr lang="en-US" dirty="0"/>
-              <a:t>6/5/2021</a:t>
+              <a:t>6/9/2021</a:t>
             </a:fld>
             <a:endParaRPr lang="en-US"/>
           </a:p>
@@ -6091,7 +6091,7 @@
           <a:p>
             <a:fld id="{2643D55F-46AB-4791-9172-4FA8DD3A6A9C}" type="datetimeFigureOut">
               <a:rPr lang="en-US" dirty="0"/>
-              <a:t>6/5/2021</a:t>
+              <a:t>6/9/2021</a:t>
             </a:fld>
             <a:endParaRPr lang="en-US"/>
           </a:p>
@@ -6259,7 +6259,7 @@
           <a:p>
             <a:fld id="{58026881-8A08-449C-8D73-E5F201F814C1}" type="datetimeFigureOut">
               <a:rPr lang="en-US" dirty="0"/>
-              <a:t>6/5/2021</a:t>
+              <a:t>6/9/2021</a:t>
             </a:fld>
             <a:endParaRPr lang="en-US"/>
           </a:p>
@@ -6549,7 +6549,7 @@
           <a:p>
             <a:fld id="{1BEB5A5E-0C07-4E93-A112-D37B4D166B30}" type="datetimeFigureOut">
               <a:rPr lang="en-US" dirty="0"/>
-              <a:t>6/5/2021</a:t>
+              <a:t>6/9/2021</a:t>
             </a:fld>
             <a:endParaRPr lang="en-US"/>
           </a:p>
@@ -6872,7 +6872,7 @@
           <a:p>
             <a:fld id="{9E1F71C5-DC57-4358-A1EA-30C08AF6E3C5}" type="datetimeFigureOut">
               <a:rPr lang="en-US" dirty="0"/>
-              <a:t>6/5/2021</a:t>
+              <a:t>6/9/2021</a:t>
             </a:fld>
             <a:endParaRPr lang="en-US"/>
           </a:p>
@@ -7281,7 +7281,7 @@
           <a:p>
             <a:fld id="{12571DBA-DE60-4731-B773-47AAA185C143}" type="datetimeFigureOut">
               <a:rPr lang="en-US" dirty="0"/>
-              <a:t>6/5/2021</a:t>
+              <a:t>6/9/2021</a:t>
             </a:fld>
             <a:endParaRPr lang="en-US"/>
           </a:p>
@@ -7398,7 +7398,7 @@
           <a:p>
             <a:fld id="{4F170639-886C-4FCF-9EAB-ABB5DA3F3F4A}" type="datetimeFigureOut">
               <a:rPr lang="en-US" dirty="0"/>
-              <a:t>6/5/2021</a:t>
+              <a:t>6/9/2021</a:t>
             </a:fld>
             <a:endParaRPr lang="en-US"/>
           </a:p>
@@ -7493,7 +7493,7 @@
           <a:p>
             <a:fld id="{34C4A628-C83B-4C66-83F4-1711CE3738FD}" type="datetimeFigureOut">
               <a:rPr lang="en-US" dirty="0"/>
-              <a:t>6/5/2021</a:t>
+              <a:t>6/9/2021</a:t>
             </a:fld>
             <a:endParaRPr lang="en-US"/>
           </a:p>
@@ -7778,7 +7778,7 @@
           <a:p>
             <a:fld id="{B88C1D73-9400-43CA-A37F-F9B7D00DE14C}" type="datetimeFigureOut">
               <a:rPr lang="en-US" dirty="0"/>
-              <a:t>6/5/2021</a:t>
+              <a:t>6/9/2021</a:t>
             </a:fld>
             <a:endParaRPr lang="en-US"/>
           </a:p>
@@ -8050,7 +8050,7 @@
           <a:p>
             <a:fld id="{188B7711-B905-4633-B4D7-6F3A49A2E7D9}" type="datetimeFigureOut">
               <a:rPr lang="en-US" dirty="0"/>
-              <a:t>6/5/2021</a:t>
+              <a:t>6/9/2021</a:t>
             </a:fld>
             <a:endParaRPr lang="en-US"/>
           </a:p>
@@ -8300,7 +8300,7 @@
             <a:fld id="{89C235CF-BDA2-4E7E-8BBD-350479985E74}" type="datetimeFigureOut">
               <a:rPr lang="en-US" dirty="0"/>
               <a:pPr/>
-              <a:t>6/5/2021</a:t>
+              <a:t>6/9/2021</a:t>
             </a:fld>
             <a:endParaRPr lang="en-US"/>
           </a:p>
@@ -9531,7 +9531,7 @@
           <a:p>
             <a:r>
               <a:rPr lang="en-US" dirty="0"/>
-              <a:t>Oversample and </a:t>
+              <a:t>Oversampling and </a:t>
             </a:r>
             <a:r>
               <a:rPr lang="en-US" dirty="0" err="1"/>
@@ -9575,15 +9575,7 @@
           <a:p>
             <a:r>
               <a:rPr lang="en-US" dirty="0"/>
-              <a:t>They help us build models when we are trying to predict a minority case. </a:t>
-            </a:r>
-            <a:r>
-              <a:rPr lang="en-US"/>
-              <a:t>Examples: fraud </a:t>
-            </a:r>
-            <a:r>
-              <a:rPr lang="en-US" dirty="0"/>
-              <a:t>detection and medical diagnosis</a:t>
+              <a:t>They help us build models when we are trying to predict a minority case. Examples: fraud detection and medical diagnosis</a:t>
             </a:r>
           </a:p>
           <a:p>
@@ -9626,6 +9618,430 @@
   <p:clrMapOvr>
     <a:masterClrMapping/>
   </p:clrMapOvr>
+  <p:timing>
+    <p:tnLst>
+      <p:par>
+        <p:cTn id="1" dur="indefinite" restart="never" nodeType="tmRoot">
+          <p:childTnLst>
+            <p:seq concurrent="1" nextAc="seek">
+              <p:cTn id="2" dur="indefinite" nodeType="mainSeq">
+                <p:childTnLst>
+                  <p:par>
+                    <p:cTn id="3" fill="hold">
+                      <p:stCondLst>
+                        <p:cond delay="indefinite"/>
+                      </p:stCondLst>
+                      <p:childTnLst>
+                        <p:par>
+                          <p:cTn id="4" fill="hold">
+                            <p:stCondLst>
+                              <p:cond delay="0"/>
+                            </p:stCondLst>
+                            <p:childTnLst>
+                              <p:par>
+                                <p:cTn id="5" presetID="2" presetClass="entr" presetSubtype="4" fill="hold" nodeType="clickEffect">
+                                  <p:stCondLst>
+                                    <p:cond delay="0"/>
+                                  </p:stCondLst>
+                                  <p:childTnLst>
+                                    <p:set>
+                                      <p:cBhvr>
+                                        <p:cTn id="6" dur="1" fill="hold">
+                                          <p:stCondLst>
+                                            <p:cond delay="0"/>
+                                          </p:stCondLst>
+                                        </p:cTn>
+                                        <p:tgtEl>
+                                          <p:spTgt spid="3">
+                                            <p:txEl>
+                                              <p:pRg st="2" end="2"/>
+                                            </p:txEl>
+                                          </p:spTgt>
+                                        </p:tgtEl>
+                                        <p:attrNameLst>
+                                          <p:attrName>style.visibility</p:attrName>
+                                        </p:attrNameLst>
+                                      </p:cBhvr>
+                                      <p:to>
+                                        <p:strVal val="visible"/>
+                                      </p:to>
+                                    </p:set>
+                                    <p:anim calcmode="lin" valueType="num">
+                                      <p:cBhvr additive="base">
+                                        <p:cTn id="7" dur="500" fill="hold"/>
+                                        <p:tgtEl>
+                                          <p:spTgt spid="3">
+                                            <p:txEl>
+                                              <p:pRg st="2" end="2"/>
+                                            </p:txEl>
+                                          </p:spTgt>
+                                        </p:tgtEl>
+                                        <p:attrNameLst>
+                                          <p:attrName>ppt_x</p:attrName>
+                                        </p:attrNameLst>
+                                      </p:cBhvr>
+                                      <p:tavLst>
+                                        <p:tav tm="0">
+                                          <p:val>
+                                            <p:strVal val="#ppt_x"/>
+                                          </p:val>
+                                        </p:tav>
+                                        <p:tav tm="100000">
+                                          <p:val>
+                                            <p:strVal val="#ppt_x"/>
+                                          </p:val>
+                                        </p:tav>
+                                      </p:tavLst>
+                                    </p:anim>
+                                    <p:anim calcmode="lin" valueType="num">
+                                      <p:cBhvr additive="base">
+                                        <p:cTn id="8" dur="500" fill="hold"/>
+                                        <p:tgtEl>
+                                          <p:spTgt spid="3">
+                                            <p:txEl>
+                                              <p:pRg st="2" end="2"/>
+                                            </p:txEl>
+                                          </p:spTgt>
+                                        </p:tgtEl>
+                                        <p:attrNameLst>
+                                          <p:attrName>ppt_y</p:attrName>
+                                        </p:attrNameLst>
+                                      </p:cBhvr>
+                                      <p:tavLst>
+                                        <p:tav tm="0">
+                                          <p:val>
+                                            <p:strVal val="1+#ppt_h/2"/>
+                                          </p:val>
+                                        </p:tav>
+                                        <p:tav tm="100000">
+                                          <p:val>
+                                            <p:strVal val="#ppt_y"/>
+                                          </p:val>
+                                        </p:tav>
+                                      </p:tavLst>
+                                    </p:anim>
+                                  </p:childTnLst>
+                                </p:cTn>
+                              </p:par>
+                            </p:childTnLst>
+                          </p:cTn>
+                        </p:par>
+                      </p:childTnLst>
+                    </p:cTn>
+                  </p:par>
+                  <p:par>
+                    <p:cTn id="9" fill="hold">
+                      <p:stCondLst>
+                        <p:cond delay="indefinite"/>
+                      </p:stCondLst>
+                      <p:childTnLst>
+                        <p:par>
+                          <p:cTn id="10" fill="hold">
+                            <p:stCondLst>
+                              <p:cond delay="0"/>
+                            </p:stCondLst>
+                            <p:childTnLst>
+                              <p:par>
+                                <p:cTn id="11" presetID="2" presetClass="entr" presetSubtype="4" fill="hold" nodeType="clickEffect">
+                                  <p:stCondLst>
+                                    <p:cond delay="0"/>
+                                  </p:stCondLst>
+                                  <p:childTnLst>
+                                    <p:set>
+                                      <p:cBhvr>
+                                        <p:cTn id="12" dur="1" fill="hold">
+                                          <p:stCondLst>
+                                            <p:cond delay="0"/>
+                                          </p:stCondLst>
+                                        </p:cTn>
+                                        <p:tgtEl>
+                                          <p:spTgt spid="3">
+                                            <p:txEl>
+                                              <p:pRg st="4" end="4"/>
+                                            </p:txEl>
+                                          </p:spTgt>
+                                        </p:tgtEl>
+                                        <p:attrNameLst>
+                                          <p:attrName>style.visibility</p:attrName>
+                                        </p:attrNameLst>
+                                      </p:cBhvr>
+                                      <p:to>
+                                        <p:strVal val="visible"/>
+                                      </p:to>
+                                    </p:set>
+                                    <p:anim calcmode="lin" valueType="num">
+                                      <p:cBhvr additive="base">
+                                        <p:cTn id="13" dur="500" fill="hold"/>
+                                        <p:tgtEl>
+                                          <p:spTgt spid="3">
+                                            <p:txEl>
+                                              <p:pRg st="4" end="4"/>
+                                            </p:txEl>
+                                          </p:spTgt>
+                                        </p:tgtEl>
+                                        <p:attrNameLst>
+                                          <p:attrName>ppt_x</p:attrName>
+                                        </p:attrNameLst>
+                                      </p:cBhvr>
+                                      <p:tavLst>
+                                        <p:tav tm="0">
+                                          <p:val>
+                                            <p:strVal val="#ppt_x"/>
+                                          </p:val>
+                                        </p:tav>
+                                        <p:tav tm="100000">
+                                          <p:val>
+                                            <p:strVal val="#ppt_x"/>
+                                          </p:val>
+                                        </p:tav>
+                                      </p:tavLst>
+                                    </p:anim>
+                                    <p:anim calcmode="lin" valueType="num">
+                                      <p:cBhvr additive="base">
+                                        <p:cTn id="14" dur="500" fill="hold"/>
+                                        <p:tgtEl>
+                                          <p:spTgt spid="3">
+                                            <p:txEl>
+                                              <p:pRg st="4" end="4"/>
+                                            </p:txEl>
+                                          </p:spTgt>
+                                        </p:tgtEl>
+                                        <p:attrNameLst>
+                                          <p:attrName>ppt_y</p:attrName>
+                                        </p:attrNameLst>
+                                      </p:cBhvr>
+                                      <p:tavLst>
+                                        <p:tav tm="0">
+                                          <p:val>
+                                            <p:strVal val="1+#ppt_h/2"/>
+                                          </p:val>
+                                        </p:tav>
+                                        <p:tav tm="100000">
+                                          <p:val>
+                                            <p:strVal val="#ppt_y"/>
+                                          </p:val>
+                                        </p:tav>
+                                      </p:tavLst>
+                                    </p:anim>
+                                  </p:childTnLst>
+                                </p:cTn>
+                              </p:par>
+                              <p:par>
+                                <p:cTn id="15" presetID="2" presetClass="entr" presetSubtype="4" fill="hold" nodeType="withEffect">
+                                  <p:stCondLst>
+                                    <p:cond delay="0"/>
+                                  </p:stCondLst>
+                                  <p:childTnLst>
+                                    <p:set>
+                                      <p:cBhvr>
+                                        <p:cTn id="16" dur="1" fill="hold">
+                                          <p:stCondLst>
+                                            <p:cond delay="0"/>
+                                          </p:stCondLst>
+                                        </p:cTn>
+                                        <p:tgtEl>
+                                          <p:spTgt spid="3">
+                                            <p:txEl>
+                                              <p:pRg st="5" end="5"/>
+                                            </p:txEl>
+                                          </p:spTgt>
+                                        </p:tgtEl>
+                                        <p:attrNameLst>
+                                          <p:attrName>style.visibility</p:attrName>
+                                        </p:attrNameLst>
+                                      </p:cBhvr>
+                                      <p:to>
+                                        <p:strVal val="visible"/>
+                                      </p:to>
+                                    </p:set>
+                                    <p:anim calcmode="lin" valueType="num">
+                                      <p:cBhvr additive="base">
+                                        <p:cTn id="17" dur="500" fill="hold"/>
+                                        <p:tgtEl>
+                                          <p:spTgt spid="3">
+                                            <p:txEl>
+                                              <p:pRg st="5" end="5"/>
+                                            </p:txEl>
+                                          </p:spTgt>
+                                        </p:tgtEl>
+                                        <p:attrNameLst>
+                                          <p:attrName>ppt_x</p:attrName>
+                                        </p:attrNameLst>
+                                      </p:cBhvr>
+                                      <p:tavLst>
+                                        <p:tav tm="0">
+                                          <p:val>
+                                            <p:strVal val="#ppt_x"/>
+                                          </p:val>
+                                        </p:tav>
+                                        <p:tav tm="100000">
+                                          <p:val>
+                                            <p:strVal val="#ppt_x"/>
+                                          </p:val>
+                                        </p:tav>
+                                      </p:tavLst>
+                                    </p:anim>
+                                    <p:anim calcmode="lin" valueType="num">
+                                      <p:cBhvr additive="base">
+                                        <p:cTn id="18" dur="500" fill="hold"/>
+                                        <p:tgtEl>
+                                          <p:spTgt spid="3">
+                                            <p:txEl>
+                                              <p:pRg st="5" end="5"/>
+                                            </p:txEl>
+                                          </p:spTgt>
+                                        </p:tgtEl>
+                                        <p:attrNameLst>
+                                          <p:attrName>ppt_y</p:attrName>
+                                        </p:attrNameLst>
+                                      </p:cBhvr>
+                                      <p:tavLst>
+                                        <p:tav tm="0">
+                                          <p:val>
+                                            <p:strVal val="1+#ppt_h/2"/>
+                                          </p:val>
+                                        </p:tav>
+                                        <p:tav tm="100000">
+                                          <p:val>
+                                            <p:strVal val="#ppt_y"/>
+                                          </p:val>
+                                        </p:tav>
+                                      </p:tavLst>
+                                    </p:anim>
+                                  </p:childTnLst>
+                                </p:cTn>
+                              </p:par>
+                            </p:childTnLst>
+                          </p:cTn>
+                        </p:par>
+                      </p:childTnLst>
+                    </p:cTn>
+                  </p:par>
+                  <p:par>
+                    <p:cTn id="19" fill="hold">
+                      <p:stCondLst>
+                        <p:cond delay="indefinite"/>
+                      </p:stCondLst>
+                      <p:childTnLst>
+                        <p:par>
+                          <p:cTn id="20" fill="hold">
+                            <p:stCondLst>
+                              <p:cond delay="0"/>
+                            </p:stCondLst>
+                            <p:childTnLst>
+                              <p:par>
+                                <p:cTn id="21" presetID="2" presetClass="entr" presetSubtype="4" fill="hold" nodeType="clickEffect">
+                                  <p:stCondLst>
+                                    <p:cond delay="0"/>
+                                  </p:stCondLst>
+                                  <p:childTnLst>
+                                    <p:set>
+                                      <p:cBhvr>
+                                        <p:cTn id="22" dur="1" fill="hold">
+                                          <p:stCondLst>
+                                            <p:cond delay="0"/>
+                                          </p:stCondLst>
+                                        </p:cTn>
+                                        <p:tgtEl>
+                                          <p:spTgt spid="3">
+                                            <p:txEl>
+                                              <p:pRg st="7" end="7"/>
+                                            </p:txEl>
+                                          </p:spTgt>
+                                        </p:tgtEl>
+                                        <p:attrNameLst>
+                                          <p:attrName>style.visibility</p:attrName>
+                                        </p:attrNameLst>
+                                      </p:cBhvr>
+                                      <p:to>
+                                        <p:strVal val="visible"/>
+                                      </p:to>
+                                    </p:set>
+                                    <p:anim calcmode="lin" valueType="num">
+                                      <p:cBhvr additive="base">
+                                        <p:cTn id="23" dur="500" fill="hold"/>
+                                        <p:tgtEl>
+                                          <p:spTgt spid="3">
+                                            <p:txEl>
+                                              <p:pRg st="7" end="7"/>
+                                            </p:txEl>
+                                          </p:spTgt>
+                                        </p:tgtEl>
+                                        <p:attrNameLst>
+                                          <p:attrName>ppt_x</p:attrName>
+                                        </p:attrNameLst>
+                                      </p:cBhvr>
+                                      <p:tavLst>
+                                        <p:tav tm="0">
+                                          <p:val>
+                                            <p:strVal val="#ppt_x"/>
+                                          </p:val>
+                                        </p:tav>
+                                        <p:tav tm="100000">
+                                          <p:val>
+                                            <p:strVal val="#ppt_x"/>
+                                          </p:val>
+                                        </p:tav>
+                                      </p:tavLst>
+                                    </p:anim>
+                                    <p:anim calcmode="lin" valueType="num">
+                                      <p:cBhvr additive="base">
+                                        <p:cTn id="24" dur="500" fill="hold"/>
+                                        <p:tgtEl>
+                                          <p:spTgt spid="3">
+                                            <p:txEl>
+                                              <p:pRg st="7" end="7"/>
+                                            </p:txEl>
+                                          </p:spTgt>
+                                        </p:tgtEl>
+                                        <p:attrNameLst>
+                                          <p:attrName>ppt_y</p:attrName>
+                                        </p:attrNameLst>
+                                      </p:cBhvr>
+                                      <p:tavLst>
+                                        <p:tav tm="0">
+                                          <p:val>
+                                            <p:strVal val="1+#ppt_h/2"/>
+                                          </p:val>
+                                        </p:tav>
+                                        <p:tav tm="100000">
+                                          <p:val>
+                                            <p:strVal val="#ppt_y"/>
+                                          </p:val>
+                                        </p:tav>
+                                      </p:tavLst>
+                                    </p:anim>
+                                  </p:childTnLst>
+                                </p:cTn>
+                              </p:par>
+                            </p:childTnLst>
+                          </p:cTn>
+                        </p:par>
+                      </p:childTnLst>
+                    </p:cTn>
+                  </p:par>
+                </p:childTnLst>
+              </p:cTn>
+              <p:prevCondLst>
+                <p:cond evt="onPrev" delay="0">
+                  <p:tgtEl>
+                    <p:sldTgt/>
+                  </p:tgtEl>
+                </p:cond>
+              </p:prevCondLst>
+              <p:nextCondLst>
+                <p:cond evt="onNext" delay="0">
+                  <p:tgtEl>
+                    <p:sldTgt/>
+                  </p:tgtEl>
+                </p:cond>
+              </p:nextCondLst>
+            </p:seq>
+          </p:childTnLst>
+        </p:cTn>
+      </p:par>
+    </p:tnLst>
+  </p:timing>
 </p:sld>
 </file>
 

</xml_diff>